<commit_message>
Presentation to remind me what to say in the standup meeting.
</commit_message>
<xml_diff>
--- a/Documentation/Sprint3/Presentation.pptx
+++ b/Documentation/Sprint3/Presentation.pptx
@@ -10,6 +10,10 @@
     <p:sldId id="275" r:id="rId4"/>
     <p:sldId id="276" r:id="rId5"/>
     <p:sldId id="277" r:id="rId6"/>
+    <p:sldId id="278" r:id="rId7"/>
+    <p:sldId id="279" r:id="rId8"/>
+    <p:sldId id="280" r:id="rId9"/>
+    <p:sldId id="281" r:id="rId10"/>
   </p:sldIdLst>
   <p:sldSz cx="12192000" cy="6858000"/>
   <p:notesSz cx="6858000" cy="9144000"/>
@@ -108,6 +112,11 @@
       </a:defRPr>
     </a:lvl9pPr>
   </p:defaultTextStyle>
+  <p:extLst>
+    <p:ext uri="{EFAFB233-063F-42B5-8137-9DF3F51BA10A}">
+      <p15:sldGuideLst xmlns:p15="http://schemas.microsoft.com/office/powerpoint/2012/main"/>
+    </p:ext>
+  </p:extLst>
 </p:presentation>
 </file>
 
@@ -260,7 +269,7 @@
           <a:p>
             <a:fld id="{84B73F7A-5B66-48EA-B61D-9E6E3766D02A}" type="datetimeFigureOut">
               <a:rPr lang="en-GB" smtClean="0"/>
-              <a:t>23/11/2020</a:t>
+              <a:t>27/11/2020</a:t>
             </a:fld>
             <a:endParaRPr lang="en-GB"/>
           </a:p>
@@ -460,7 +469,7 @@
           <a:p>
             <a:fld id="{84B73F7A-5B66-48EA-B61D-9E6E3766D02A}" type="datetimeFigureOut">
               <a:rPr lang="en-GB" smtClean="0"/>
-              <a:t>23/11/2020</a:t>
+              <a:t>27/11/2020</a:t>
             </a:fld>
             <a:endParaRPr lang="en-GB"/>
           </a:p>
@@ -670,7 +679,7 @@
           <a:p>
             <a:fld id="{84B73F7A-5B66-48EA-B61D-9E6E3766D02A}" type="datetimeFigureOut">
               <a:rPr lang="en-GB" smtClean="0"/>
-              <a:t>23/11/2020</a:t>
+              <a:t>27/11/2020</a:t>
             </a:fld>
             <a:endParaRPr lang="en-GB"/>
           </a:p>
@@ -870,7 +879,7 @@
           <a:p>
             <a:fld id="{84B73F7A-5B66-48EA-B61D-9E6E3766D02A}" type="datetimeFigureOut">
               <a:rPr lang="en-GB" smtClean="0"/>
-              <a:t>23/11/2020</a:t>
+              <a:t>27/11/2020</a:t>
             </a:fld>
             <a:endParaRPr lang="en-GB"/>
           </a:p>
@@ -1146,7 +1155,7 @@
           <a:p>
             <a:fld id="{84B73F7A-5B66-48EA-B61D-9E6E3766D02A}" type="datetimeFigureOut">
               <a:rPr lang="en-GB" smtClean="0"/>
-              <a:t>23/11/2020</a:t>
+              <a:t>27/11/2020</a:t>
             </a:fld>
             <a:endParaRPr lang="en-GB"/>
           </a:p>
@@ -1414,7 +1423,7 @@
           <a:p>
             <a:fld id="{84B73F7A-5B66-48EA-B61D-9E6E3766D02A}" type="datetimeFigureOut">
               <a:rPr lang="en-GB" smtClean="0"/>
-              <a:t>23/11/2020</a:t>
+              <a:t>27/11/2020</a:t>
             </a:fld>
             <a:endParaRPr lang="en-GB"/>
           </a:p>
@@ -1829,7 +1838,7 @@
           <a:p>
             <a:fld id="{84B73F7A-5B66-48EA-B61D-9E6E3766D02A}" type="datetimeFigureOut">
               <a:rPr lang="en-GB" smtClean="0"/>
-              <a:t>23/11/2020</a:t>
+              <a:t>27/11/2020</a:t>
             </a:fld>
             <a:endParaRPr lang="en-GB"/>
           </a:p>
@@ -1971,7 +1980,7 @@
           <a:p>
             <a:fld id="{84B73F7A-5B66-48EA-B61D-9E6E3766D02A}" type="datetimeFigureOut">
               <a:rPr lang="en-GB" smtClean="0"/>
-              <a:t>23/11/2020</a:t>
+              <a:t>27/11/2020</a:t>
             </a:fld>
             <a:endParaRPr lang="en-GB"/>
           </a:p>
@@ -2084,7 +2093,7 @@
           <a:p>
             <a:fld id="{84B73F7A-5B66-48EA-B61D-9E6E3766D02A}" type="datetimeFigureOut">
               <a:rPr lang="en-GB" smtClean="0"/>
-              <a:t>23/11/2020</a:t>
+              <a:t>27/11/2020</a:t>
             </a:fld>
             <a:endParaRPr lang="en-GB"/>
           </a:p>
@@ -2397,7 +2406,7 @@
           <a:p>
             <a:fld id="{84B73F7A-5B66-48EA-B61D-9E6E3766D02A}" type="datetimeFigureOut">
               <a:rPr lang="en-GB" smtClean="0"/>
-              <a:t>23/11/2020</a:t>
+              <a:t>27/11/2020</a:t>
             </a:fld>
             <a:endParaRPr lang="en-GB"/>
           </a:p>
@@ -2686,7 +2695,7 @@
           <a:p>
             <a:fld id="{84B73F7A-5B66-48EA-B61D-9E6E3766D02A}" type="datetimeFigureOut">
               <a:rPr lang="en-GB" smtClean="0"/>
-              <a:t>23/11/2020</a:t>
+              <a:t>27/11/2020</a:t>
             </a:fld>
             <a:endParaRPr lang="en-GB"/>
           </a:p>
@@ -2929,7 +2938,7 @@
           <a:p>
             <a:fld id="{84B73F7A-5B66-48EA-B61D-9E6E3766D02A}" type="datetimeFigureOut">
               <a:rPr lang="en-GB" smtClean="0"/>
-              <a:t>23/11/2020</a:t>
+              <a:t>27/11/2020</a:t>
             </a:fld>
             <a:endParaRPr lang="en-GB"/>
           </a:p>
@@ -4331,6 +4340,492 @@
 </p:sld>
 </file>
 
+<file path=ppt/slides/slide6.xml><?xml version="1.0" encoding="utf-8"?>
+<p:sld xmlns:a="http://schemas.openxmlformats.org/drawingml/2006/main" xmlns:r="http://schemas.openxmlformats.org/officeDocument/2006/relationships" xmlns:p="http://schemas.openxmlformats.org/presentationml/2006/main">
+  <p:cSld>
+    <p:spTree>
+      <p:nvGrpSpPr>
+        <p:cNvPr id="1" name=""/>
+        <p:cNvGrpSpPr/>
+        <p:nvPr/>
+      </p:nvGrpSpPr>
+      <p:grpSpPr>
+        <a:xfrm>
+          <a:off x="0" y="0"/>
+          <a:ext cx="0" cy="0"/>
+          <a:chOff x="0" y="0"/>
+          <a:chExt cx="0" cy="0"/>
+        </a:xfrm>
+      </p:grpSpPr>
+      <p:sp>
+        <p:nvSpPr>
+          <p:cNvPr id="2" name="Title 1">
+            <a:extLst>
+              <a:ext uri="{FF2B5EF4-FFF2-40B4-BE49-F238E27FC236}">
+                <a16:creationId xmlns:a16="http://schemas.microsoft.com/office/drawing/2014/main" id="{EBA92964-80CA-4437-8F26-0AE5A9B4A6D6}"/>
+              </a:ext>
+            </a:extLst>
+          </p:cNvPr>
+          <p:cNvSpPr>
+            <a:spLocks noGrp="1"/>
+          </p:cNvSpPr>
+          <p:nvPr>
+            <p:ph type="title"/>
+          </p:nvPr>
+        </p:nvSpPr>
+        <p:spPr>
+          <a:xfrm>
+            <a:off x="3398520" y="2103437"/>
+            <a:ext cx="10515600" cy="1325563"/>
+          </a:xfrm>
+        </p:spPr>
+        <p:txBody>
+          <a:bodyPr/>
+          <a:lstStyle/>
+          <a:p>
+            <a:r>
+              <a:rPr lang="en-GB" dirty="0"/>
+              <a:t>Show comparison</a:t>
+            </a:r>
+          </a:p>
+        </p:txBody>
+      </p:sp>
+    </p:spTree>
+    <p:extLst>
+      <p:ext uri="{BB962C8B-B14F-4D97-AF65-F5344CB8AC3E}">
+        <p14:creationId xmlns:p14="http://schemas.microsoft.com/office/powerpoint/2010/main" val="2489783957"/>
+      </p:ext>
+    </p:extLst>
+  </p:cSld>
+  <p:clrMapOvr>
+    <a:masterClrMapping/>
+  </p:clrMapOvr>
+</p:sld>
+</file>
+
+<file path=ppt/slides/slide7.xml><?xml version="1.0" encoding="utf-8"?>
+<p:sld xmlns:a="http://schemas.openxmlformats.org/drawingml/2006/main" xmlns:r="http://schemas.openxmlformats.org/officeDocument/2006/relationships" xmlns:p="http://schemas.openxmlformats.org/presentationml/2006/main">
+  <p:cSld>
+    <p:spTree>
+      <p:nvGrpSpPr>
+        <p:cNvPr id="1" name=""/>
+        <p:cNvGrpSpPr/>
+        <p:nvPr/>
+      </p:nvGrpSpPr>
+      <p:grpSpPr>
+        <a:xfrm>
+          <a:off x="0" y="0"/>
+          <a:ext cx="0" cy="0"/>
+          <a:chOff x="0" y="0"/>
+          <a:chExt cx="0" cy="0"/>
+        </a:xfrm>
+      </p:grpSpPr>
+      <p:sp>
+        <p:nvSpPr>
+          <p:cNvPr id="2" name="Title 1">
+            <a:extLst>
+              <a:ext uri="{FF2B5EF4-FFF2-40B4-BE49-F238E27FC236}">
+                <a16:creationId xmlns:a16="http://schemas.microsoft.com/office/drawing/2014/main" id="{4EBBE39C-2B33-47F8-AD1E-34E5E44D2E85}"/>
+              </a:ext>
+            </a:extLst>
+          </p:cNvPr>
+          <p:cNvSpPr>
+            <a:spLocks noGrp="1"/>
+          </p:cNvSpPr>
+          <p:nvPr>
+            <p:ph type="title"/>
+          </p:nvPr>
+        </p:nvSpPr>
+        <p:spPr/>
+        <p:txBody>
+          <a:bodyPr/>
+          <a:lstStyle/>
+          <a:p>
+            <a:r>
+              <a:rPr lang="en-GB" dirty="0"/>
+              <a:t>New EA - problems</a:t>
+            </a:r>
+          </a:p>
+        </p:txBody>
+      </p:sp>
+      <p:sp>
+        <p:nvSpPr>
+          <p:cNvPr id="3" name="Content Placeholder 2">
+            <a:extLst>
+              <a:ext uri="{FF2B5EF4-FFF2-40B4-BE49-F238E27FC236}">
+                <a16:creationId xmlns:a16="http://schemas.microsoft.com/office/drawing/2014/main" id="{8C47B256-5AD1-4944-AF58-053034C40674}"/>
+              </a:ext>
+            </a:extLst>
+          </p:cNvPr>
+          <p:cNvSpPr>
+            <a:spLocks noGrp="1"/>
+          </p:cNvSpPr>
+          <p:nvPr>
+            <p:ph idx="1"/>
+          </p:nvPr>
+        </p:nvSpPr>
+        <p:spPr/>
+        <p:txBody>
+          <a:bodyPr/>
+          <a:lstStyle/>
+          <a:p>
+            <a:r>
+              <a:rPr lang="en-GB" dirty="0"/>
+              <a:t>Exponential increase in time taken (lots of nested for loops) as input size increases.</a:t>
+            </a:r>
+          </a:p>
+          <a:p>
+            <a:r>
+              <a:rPr lang="en-GB" dirty="0"/>
+              <a:t>Atom movements are still mostly unfavourable.</a:t>
+            </a:r>
+          </a:p>
+          <a:p>
+            <a:r>
+              <a:rPr lang="en-GB" dirty="0"/>
+              <a:t>Still getting stuck in local minima.</a:t>
+            </a:r>
+          </a:p>
+          <a:p>
+            <a:r>
+              <a:rPr lang="en-GB" dirty="0"/>
+              <a:t>EMT is still being used (instead of DFT). </a:t>
+            </a:r>
+          </a:p>
+          <a:p>
+            <a:r>
+              <a:rPr lang="en-GB" dirty="0"/>
+              <a:t>My poor, trusty computer is working really hard </a:t>
+            </a:r>
+            <a:r>
+              <a:rPr lang="en-GB" dirty="0">
+                <a:sym typeface="Wingdings" panose="05000000000000000000" pitchFamily="2" charset="2"/>
+              </a:rPr>
+              <a:t>- thousands of calculations, array changes &amp; function calls per iteration.</a:t>
+            </a:r>
+            <a:endParaRPr lang="en-GB" dirty="0"/>
+          </a:p>
+        </p:txBody>
+      </p:sp>
+    </p:spTree>
+    <p:extLst>
+      <p:ext uri="{BB962C8B-B14F-4D97-AF65-F5344CB8AC3E}">
+        <p14:creationId xmlns:p14="http://schemas.microsoft.com/office/powerpoint/2010/main" val="2619900196"/>
+      </p:ext>
+    </p:extLst>
+  </p:cSld>
+  <p:clrMapOvr>
+    <a:masterClrMapping/>
+  </p:clrMapOvr>
+</p:sld>
+</file>
+
+<file path=ppt/slides/slide8.xml><?xml version="1.0" encoding="utf-8"?>
+<p:sld xmlns:a="http://schemas.openxmlformats.org/drawingml/2006/main" xmlns:r="http://schemas.openxmlformats.org/officeDocument/2006/relationships" xmlns:p="http://schemas.openxmlformats.org/presentationml/2006/main">
+  <p:cSld>
+    <p:spTree>
+      <p:nvGrpSpPr>
+        <p:cNvPr id="1" name=""/>
+        <p:cNvGrpSpPr/>
+        <p:nvPr/>
+      </p:nvGrpSpPr>
+      <p:grpSpPr>
+        <a:xfrm>
+          <a:off x="0" y="0"/>
+          <a:ext cx="0" cy="0"/>
+          <a:chOff x="0" y="0"/>
+          <a:chExt cx="0" cy="0"/>
+        </a:xfrm>
+      </p:grpSpPr>
+      <p:sp>
+        <p:nvSpPr>
+          <p:cNvPr id="2" name="Title 1">
+            <a:extLst>
+              <a:ext uri="{FF2B5EF4-FFF2-40B4-BE49-F238E27FC236}">
+                <a16:creationId xmlns:a16="http://schemas.microsoft.com/office/drawing/2014/main" id="{ED68A338-2EFF-4B16-BED7-8BB203F8A044}"/>
+              </a:ext>
+            </a:extLst>
+          </p:cNvPr>
+          <p:cNvSpPr>
+            <a:spLocks noGrp="1"/>
+          </p:cNvSpPr>
+          <p:nvPr>
+            <p:ph type="title"/>
+          </p:nvPr>
+        </p:nvSpPr>
+        <p:spPr>
+          <a:xfrm>
+            <a:off x="838200" y="0"/>
+            <a:ext cx="10515600" cy="1325563"/>
+          </a:xfrm>
+        </p:spPr>
+        <p:txBody>
+          <a:bodyPr/>
+          <a:lstStyle/>
+          <a:p>
+            <a:r>
+              <a:rPr lang="en-GB" dirty="0"/>
+              <a:t>Next steps for the end of sprint 3</a:t>
+            </a:r>
+          </a:p>
+        </p:txBody>
+      </p:sp>
+      <p:sp>
+        <p:nvSpPr>
+          <p:cNvPr id="3" name="Content Placeholder 2">
+            <a:extLst>
+              <a:ext uri="{FF2B5EF4-FFF2-40B4-BE49-F238E27FC236}">
+                <a16:creationId xmlns:a16="http://schemas.microsoft.com/office/drawing/2014/main" id="{86208564-DA9A-48EE-B200-209F326E0810}"/>
+              </a:ext>
+            </a:extLst>
+          </p:cNvPr>
+          <p:cNvSpPr>
+            <a:spLocks noGrp="1"/>
+          </p:cNvSpPr>
+          <p:nvPr>
+            <p:ph idx="1"/>
+          </p:nvPr>
+        </p:nvSpPr>
+        <p:spPr>
+          <a:xfrm>
+            <a:off x="838200" y="1019651"/>
+            <a:ext cx="10515600" cy="4351338"/>
+          </a:xfrm>
+        </p:spPr>
+        <p:txBody>
+          <a:bodyPr>
+            <a:normAutofit/>
+          </a:bodyPr>
+          <a:lstStyle/>
+          <a:p>
+            <a:pPr marL="514350" indent="-514350">
+              <a:buFont typeface="+mj-lt"/>
+              <a:buAutoNum type="arabicPeriod"/>
+            </a:pPr>
+            <a:r>
+              <a:rPr lang="en-GB" dirty="0"/>
+              <a:t>Get VASP or another DFT calculator working.</a:t>
+            </a:r>
+          </a:p>
+          <a:p>
+            <a:pPr marL="514350" indent="-514350">
+              <a:buFont typeface="+mj-lt"/>
+              <a:buAutoNum type="arabicPeriod"/>
+            </a:pPr>
+            <a:r>
+              <a:rPr lang="en-GB" dirty="0"/>
+              <a:t>Try using each atom’s relative size as a way of defining the standard deviation of the Gaussian distribution for atom movements, to create more favourable movements.</a:t>
+            </a:r>
+          </a:p>
+          <a:p>
+            <a:pPr marL="514350" indent="-514350">
+              <a:buFont typeface="+mj-lt"/>
+              <a:buAutoNum type="arabicPeriod"/>
+            </a:pPr>
+            <a:r>
+              <a:rPr lang="en-GB" dirty="0"/>
+              <a:t>Use Python’s Multiprocessing to reduce time spent in loops.</a:t>
+            </a:r>
+          </a:p>
+          <a:p>
+            <a:pPr marL="514350" indent="-514350">
+              <a:buFont typeface="+mj-lt"/>
+              <a:buAutoNum type="arabicPeriod"/>
+            </a:pPr>
+            <a:r>
+              <a:rPr lang="en-GB" dirty="0"/>
+              <a:t>Specifically move atoms closer or further apart as the algorithm progresses rather than just moving them randomly.</a:t>
+            </a:r>
+          </a:p>
+          <a:p>
+            <a:pPr marL="514350" indent="-514350">
+              <a:buFont typeface="+mj-lt"/>
+              <a:buAutoNum type="arabicPeriod"/>
+            </a:pPr>
+            <a:r>
+              <a:rPr lang="en-GB" dirty="0"/>
+              <a:t>Apply code optimisations like those learnt in the Vasilios module.</a:t>
+            </a:r>
+          </a:p>
+          <a:p>
+            <a:pPr marL="514350" indent="-514350">
+              <a:buFont typeface="+mj-lt"/>
+              <a:buAutoNum type="arabicPeriod"/>
+            </a:pPr>
+            <a:r>
+              <a:rPr lang="en-GB" dirty="0"/>
+              <a:t>Use a radial distribution function (doughnut) instead of Gaussian: </a:t>
+            </a:r>
+          </a:p>
+        </p:txBody>
+      </p:sp>
+      <p:pic>
+        <p:nvPicPr>
+          <p:cNvPr id="4" name="Picture 3">
+            <a:extLst>
+              <a:ext uri="{FF2B5EF4-FFF2-40B4-BE49-F238E27FC236}">
+                <a16:creationId xmlns:a16="http://schemas.microsoft.com/office/drawing/2014/main" id="{D16F6A73-9FD7-40A3-AF43-B76F85BF91ED}"/>
+              </a:ext>
+            </a:extLst>
+          </p:cNvPr>
+          <p:cNvPicPr>
+            <a:picLocks noChangeAspect="1"/>
+          </p:cNvPicPr>
+          <p:nvPr/>
+        </p:nvPicPr>
+        <p:blipFill>
+          <a:blip r:embed="rId2"/>
+          <a:stretch>
+            <a:fillRect/>
+          </a:stretch>
+        </p:blipFill>
+        <p:spPr>
+          <a:xfrm>
+            <a:off x="10890414" y="3429000"/>
+            <a:ext cx="1186016" cy="1313089"/>
+          </a:xfrm>
+          <a:prstGeom prst="rect">
+            <a:avLst/>
+          </a:prstGeom>
+        </p:spPr>
+      </p:pic>
+      <p:pic>
+        <p:nvPicPr>
+          <p:cNvPr id="5" name="Picture 4">
+            <a:extLst>
+              <a:ext uri="{FF2B5EF4-FFF2-40B4-BE49-F238E27FC236}">
+                <a16:creationId xmlns:a16="http://schemas.microsoft.com/office/drawing/2014/main" id="{C94DE97E-406C-4F14-A9ED-887BBBE80BEF}"/>
+              </a:ext>
+            </a:extLst>
+          </p:cNvPr>
+          <p:cNvPicPr>
+            <a:picLocks noChangeAspect="1"/>
+          </p:cNvPicPr>
+          <p:nvPr/>
+        </p:nvPicPr>
+        <p:blipFill>
+          <a:blip r:embed="rId3"/>
+          <a:stretch>
+            <a:fillRect/>
+          </a:stretch>
+        </p:blipFill>
+        <p:spPr>
+          <a:xfrm>
+            <a:off x="5699760" y="5147300"/>
+            <a:ext cx="3402012" cy="1616084"/>
+          </a:xfrm>
+          <a:prstGeom prst="rect">
+            <a:avLst/>
+          </a:prstGeom>
+        </p:spPr>
+      </p:pic>
+    </p:spTree>
+    <p:extLst>
+      <p:ext uri="{BB962C8B-B14F-4D97-AF65-F5344CB8AC3E}">
+        <p14:creationId xmlns:p14="http://schemas.microsoft.com/office/powerpoint/2010/main" val="2830827157"/>
+      </p:ext>
+    </p:extLst>
+  </p:cSld>
+  <p:clrMapOvr>
+    <a:masterClrMapping/>
+  </p:clrMapOvr>
+</p:sld>
+</file>
+
+<file path=ppt/slides/slide9.xml><?xml version="1.0" encoding="utf-8"?>
+<p:sld xmlns:a="http://schemas.openxmlformats.org/drawingml/2006/main" xmlns:r="http://schemas.openxmlformats.org/officeDocument/2006/relationships" xmlns:p="http://schemas.openxmlformats.org/presentationml/2006/main">
+  <p:cSld>
+    <p:spTree>
+      <p:nvGrpSpPr>
+        <p:cNvPr id="1" name=""/>
+        <p:cNvGrpSpPr/>
+        <p:nvPr/>
+      </p:nvGrpSpPr>
+      <p:grpSpPr>
+        <a:xfrm>
+          <a:off x="0" y="0"/>
+          <a:ext cx="0" cy="0"/>
+          <a:chOff x="0" y="0"/>
+          <a:chExt cx="0" cy="0"/>
+        </a:xfrm>
+      </p:grpSpPr>
+      <p:sp>
+        <p:nvSpPr>
+          <p:cNvPr id="3" name="Content Placeholder 2">
+            <a:extLst>
+              <a:ext uri="{FF2B5EF4-FFF2-40B4-BE49-F238E27FC236}">
+                <a16:creationId xmlns:a16="http://schemas.microsoft.com/office/drawing/2014/main" id="{D701892E-F438-413A-900C-73CF4F7DE504}"/>
+              </a:ext>
+            </a:extLst>
+          </p:cNvPr>
+          <p:cNvSpPr>
+            <a:spLocks noGrp="1"/>
+          </p:cNvSpPr>
+          <p:nvPr>
+            <p:ph idx="1"/>
+          </p:nvPr>
+        </p:nvSpPr>
+        <p:spPr/>
+        <p:txBody>
+          <a:bodyPr>
+            <a:normAutofit/>
+          </a:bodyPr>
+          <a:lstStyle/>
+          <a:p>
+            <a:pPr marL="0" indent="0">
+              <a:buNone/>
+            </a:pPr>
+            <a:endParaRPr lang="en-GB" dirty="0"/>
+          </a:p>
+          <a:p>
+            <a:r>
+              <a:rPr lang="en-GB" dirty="0"/>
+              <a:t>Please can you help me with the VASP installation? Zach has tried to help me but we couldn’t do it.</a:t>
+            </a:r>
+          </a:p>
+        </p:txBody>
+      </p:sp>
+      <p:sp>
+        <p:nvSpPr>
+          <p:cNvPr id="6" name="Title 5">
+            <a:extLst>
+              <a:ext uri="{FF2B5EF4-FFF2-40B4-BE49-F238E27FC236}">
+                <a16:creationId xmlns:a16="http://schemas.microsoft.com/office/drawing/2014/main" id="{D1763306-2FFF-4928-972F-3FD2CFAEBDE2}"/>
+              </a:ext>
+            </a:extLst>
+          </p:cNvPr>
+          <p:cNvSpPr>
+            <a:spLocks noGrp="1"/>
+          </p:cNvSpPr>
+          <p:nvPr>
+            <p:ph type="title"/>
+          </p:nvPr>
+        </p:nvSpPr>
+        <p:spPr/>
+        <p:txBody>
+          <a:bodyPr/>
+          <a:lstStyle/>
+          <a:p>
+            <a:r>
+              <a:rPr lang="en-GB" dirty="0"/>
+              <a:t>Ask David:</a:t>
+            </a:r>
+          </a:p>
+        </p:txBody>
+      </p:sp>
+    </p:spTree>
+    <p:extLst>
+      <p:ext uri="{BB962C8B-B14F-4D97-AF65-F5344CB8AC3E}">
+        <p14:creationId xmlns:p14="http://schemas.microsoft.com/office/powerpoint/2010/main" val="1549786129"/>
+      </p:ext>
+    </p:extLst>
+  </p:cSld>
+  <p:clrMapOvr>
+    <a:masterClrMapping/>
+  </p:clrMapOvr>
+</p:sld>
+</file>
+
 <file path=ppt/theme/theme1.xml><?xml version="1.0" encoding="utf-8"?>
 <a:theme xmlns:a="http://schemas.openxmlformats.org/drawingml/2006/main" name="Office Theme">
   <a:themeElements>

</xml_diff>